<commit_message>
Minor modifications to a lot of slideshows
</commit_message>
<xml_diff>
--- a/deep-learning-in-practice-with-pytorch/0-machine-learning.pptx
+++ b/deep-learning-in-practice-with-pytorch/0-machine-learning.pptx
@@ -22769,7 +22769,7 @@
             </a:br>
             <a:r>
               <a:rPr lang="en-US" dirty="0"/>
-              <a:t>- James et al., </a:t>
+              <a:t>- James et al. 2023. </a:t>
             </a:r>
             <a:r>
               <a:rPr lang="en-US" i="1" dirty="0"/>
@@ -22777,7 +22777,7 @@
             </a:r>
             <a:r>
               <a:rPr lang="en-US" dirty="0"/>
-              <a:t>, 2023</a:t>
+              <a:t> </a:t>
             </a:r>
           </a:p>
           <a:p>

</xml_diff>